<commit_message>
Last version of final slideshow
</commit_message>
<xml_diff>
--- a/Documents/Présentation/Demo_Finale.pptx
+++ b/Documents/Présentation/Demo_Finale.pptx
@@ -8604,8 +8604,25 @@
                 <a:latin typeface="Microsoft PhagsPa" panose="020B0502040204020203" pitchFamily="34" charset="0"/>
                 <a:ea typeface="Kozuka Gothic Pro L" panose="020B0200000000000000" pitchFamily="34" charset="-128"/>
               </a:rPr>
-              <a:t>de</a:t>
-            </a:r>
+              <a:t>du</a:t>
+            </a:r>
+            <a:endParaRPr lang="fr-FR" sz="5000" b="1" dirty="0" smtClean="0">
+              <a:solidFill>
+                <a:schemeClr val="tx1">
+                  <a:lumMod val="75000"/>
+                  <a:lumOff val="25000"/>
+                </a:schemeClr>
+              </a:solidFill>
+              <a:effectLst>
+                <a:outerShdw blurRad="38100" dist="38100" dir="2700000" algn="tl">
+                  <a:srgbClr val="000000">
+                    <a:alpha val="43137"/>
+                  </a:srgbClr>
+                </a:outerShdw>
+              </a:effectLst>
+              <a:latin typeface="Microsoft PhagsPa" panose="020B0502040204020203" pitchFamily="34" charset="0"/>
+              <a:ea typeface="Kozuka Gothic Pro L" panose="020B0200000000000000" pitchFamily="34" charset="-128"/>
+            </a:endParaRPr>
           </a:p>
         </p:txBody>
       </p:sp>
@@ -10258,6 +10275,30 @@
               </a:rPr>
               <a:t>Prévision de l’architecture logicielle plus en amont</a:t>
             </a:r>
+          </a:p>
+        </p:txBody>
+      </p:sp>
+      <p:sp>
+        <p:nvSpPr>
+          <p:cNvPr id="5" name="Espace réservé du numéro de diapositive 4"/>
+          <p:cNvSpPr>
+            <a:spLocks noGrp="1"/>
+          </p:cNvSpPr>
+          <p:nvPr>
+            <p:ph type="sldNum" sz="quarter" idx="4"/>
+          </p:nvPr>
+        </p:nvSpPr>
+        <p:spPr/>
+        <p:txBody>
+          <a:bodyPr/>
+          <a:lstStyle/>
+          <a:p>
+            <a:fld id="{DC062FA9-FE1E-4553-BF9F-5A99BD99EA25}" type="slidenum">
+              <a:rPr lang="fr-FR" smtClean="0"/>
+              <a:pPr/>
+              <a:t>12</a:t>
+            </a:fld>
+            <a:endParaRPr lang="fr-FR" dirty="0"/>
           </a:p>
         </p:txBody>
       </p:sp>

</xml_diff>